<commit_message>
Slide crowd sourcing and images
</commit_message>
<xml_diff>
--- a/ez18n-slides/ez18n_crowdsourcing.pptx
+++ b/ez18n-slides/ez18n_crowdsourcing.pptx
@@ -6,7 +6,10 @@
   </p:sldMasterIdLst>
   <p:sldIdLst>
     <p:sldId id="256" r:id="rId2"/>
-    <p:sldId id="259" r:id="rId3"/>
+    <p:sldId id="260" r:id="rId3"/>
+    <p:sldId id="261" r:id="rId4"/>
+    <p:sldId id="259" r:id="rId5"/>
+    <p:sldId id="262" r:id="rId6"/>
   </p:sldIdLst>
   <p:sldSz cx="9144000" cy="6858000" type="screen4x3"/>
   <p:notesSz cx="6858000" cy="9144000"/>
@@ -2835,6 +2838,30 @@
           </a:p>
         </p:txBody>
       </p:sp>
+      <p:pic>
+        <p:nvPicPr>
+          <p:cNvPr id="8" name="Image 7"/>
+          <p:cNvPicPr>
+            <a:picLocks noChangeAspect="1"/>
+          </p:cNvPicPr>
+          <p:nvPr userDrawn="1"/>
+        </p:nvPicPr>
+        <p:blipFill>
+          <a:blip r:embed="rId14"/>
+          <a:stretch>
+            <a:fillRect/>
+          </a:stretch>
+        </p:blipFill>
+        <p:spPr>
+          <a:xfrm rot="16200000">
+            <a:off x="6401439" y="2708695"/>
+            <a:ext cx="4502989" cy="914400"/>
+          </a:xfrm>
+          <a:prstGeom prst="rect">
+            <a:avLst/>
+          </a:prstGeom>
+        </p:spPr>
+      </p:pic>
     </p:spTree>
     <p:extLst>
       <p:ext uri="{BB962C8B-B14F-4D97-AF65-F5344CB8AC3E}">
@@ -3234,6 +3261,291 @@
           <a:p>
             <a:r>
               <a:rPr lang="fr-FR" dirty="0" smtClean="0"/>
+              <a:t>Externaliser i18n</a:t>
+            </a:r>
+            <a:endParaRPr lang="fr-FR" dirty="0"/>
+          </a:p>
+        </p:txBody>
+      </p:sp>
+      <p:sp>
+        <p:nvSpPr>
+          <p:cNvPr id="3" name="Espace réservé du contenu 2"/>
+          <p:cNvSpPr>
+            <a:spLocks noGrp="1"/>
+          </p:cNvSpPr>
+          <p:nvPr>
+            <p:ph idx="1"/>
+          </p:nvPr>
+        </p:nvSpPr>
+        <p:spPr/>
+        <p:txBody>
+          <a:bodyPr>
+            <a:normAutofit/>
+          </a:bodyPr>
+          <a:lstStyle/>
+          <a:p>
+            <a:r>
+              <a:rPr lang="fr-FR" dirty="0" smtClean="0"/>
+              <a:t>Les langues non maitrisées par l’équipe</a:t>
+            </a:r>
+          </a:p>
+          <a:p>
+            <a:r>
+              <a:rPr lang="fr-FR" dirty="0" smtClean="0"/>
+              <a:t>Fichier </a:t>
+            </a:r>
+            <a:r>
+              <a:rPr lang="fr-FR" dirty="0" err="1" smtClean="0"/>
+              <a:t>excel</a:t>
+            </a:r>
+            <a:r>
+              <a:rPr lang="fr-FR" dirty="0" smtClean="0"/>
+              <a:t> ?</a:t>
+            </a:r>
+          </a:p>
+          <a:p>
+            <a:pPr lvl="1"/>
+            <a:r>
+              <a:rPr lang="fr-FR" dirty="0" smtClean="0"/>
+              <a:t>Ok mais on intègre comment ?</a:t>
+            </a:r>
+          </a:p>
+          <a:p>
+            <a:pPr lvl="1"/>
+            <a:endParaRPr lang="fr-FR" dirty="0" smtClean="0"/>
+          </a:p>
+          <a:p>
+            <a:r>
+              <a:rPr lang="fr-FR" dirty="0" smtClean="0"/>
+              <a:t>Outils de gestion de localisation</a:t>
+            </a:r>
+          </a:p>
+          <a:p>
+            <a:pPr lvl="1"/>
+            <a:r>
+              <a:rPr lang="en-US" dirty="0">
+                <a:hlinkClick r:id="rId2"/>
+              </a:rPr>
+              <a:t>http://www.i18nguy.com/</a:t>
+            </a:r>
+            <a:r>
+              <a:rPr lang="en-US" dirty="0" smtClean="0">
+                <a:hlinkClick r:id="rId2"/>
+              </a:rPr>
+              <a:t>TranslationTools.html</a:t>
+            </a:r>
+            <a:endParaRPr lang="en-US" dirty="0" smtClean="0"/>
+          </a:p>
+          <a:p>
+            <a:pPr lvl="1"/>
+            <a:r>
+              <a:rPr lang="fr-FR" dirty="0" err="1" smtClean="0"/>
+              <a:t>Built</a:t>
+            </a:r>
+            <a:r>
+              <a:rPr lang="fr-FR" dirty="0" smtClean="0"/>
+              <a:t>-in IDE</a:t>
+            </a:r>
+          </a:p>
+          <a:p>
+            <a:pPr lvl="1"/>
+            <a:r>
+              <a:rPr lang="fr-FR" dirty="0" smtClean="0"/>
+              <a:t>Edition simultanée de .</a:t>
+            </a:r>
+            <a:r>
+              <a:rPr lang="fr-FR" dirty="0" err="1" smtClean="0"/>
+              <a:t>properties</a:t>
+            </a:r>
+            <a:endParaRPr lang="fr-FR" dirty="0" smtClean="0"/>
+          </a:p>
+          <a:p>
+            <a:endParaRPr lang="fr-FR" dirty="0"/>
+          </a:p>
+        </p:txBody>
+      </p:sp>
+    </p:spTree>
+    <p:extLst>
+      <p:ext uri="{BB962C8B-B14F-4D97-AF65-F5344CB8AC3E}">
+        <p14:creationId xmlns:p14="http://schemas.microsoft.com/office/powerpoint/2010/main" val="3597133846"/>
+      </p:ext>
+    </p:extLst>
+  </p:cSld>
+  <p:clrMapOvr>
+    <a:masterClrMapping/>
+  </p:clrMapOvr>
+</p:sld>
+</file>
+
+<file path=ppt/slides/slide3.xml><?xml version="1.0" encoding="utf-8"?>
+<p:sld xmlns:a="http://schemas.openxmlformats.org/drawingml/2006/main" xmlns:r="http://schemas.openxmlformats.org/officeDocument/2006/relationships" xmlns:p="http://schemas.openxmlformats.org/presentationml/2006/main">
+  <p:cSld>
+    <p:spTree>
+      <p:nvGrpSpPr>
+        <p:cNvPr id="1" name=""/>
+        <p:cNvGrpSpPr/>
+        <p:nvPr/>
+      </p:nvGrpSpPr>
+      <p:grpSpPr>
+        <a:xfrm>
+          <a:off x="0" y="0"/>
+          <a:ext cx="0" cy="0"/>
+          <a:chOff x="0" y="0"/>
+          <a:chExt cx="0" cy="0"/>
+        </a:xfrm>
+      </p:grpSpPr>
+      <p:sp>
+        <p:nvSpPr>
+          <p:cNvPr id="2" name="Titre 1"/>
+          <p:cNvSpPr>
+            <a:spLocks noGrp="1"/>
+          </p:cNvSpPr>
+          <p:nvPr>
+            <p:ph type="title"/>
+          </p:nvPr>
+        </p:nvSpPr>
+        <p:spPr/>
+        <p:txBody>
+          <a:bodyPr/>
+          <a:lstStyle/>
+          <a:p>
+            <a:r>
+              <a:rPr lang="fr-FR" dirty="0" smtClean="0"/>
+              <a:t>Vraiment pas satisfaisant</a:t>
+            </a:r>
+            <a:endParaRPr lang="fr-FR" dirty="0"/>
+          </a:p>
+        </p:txBody>
+      </p:sp>
+      <p:sp>
+        <p:nvSpPr>
+          <p:cNvPr id="3" name="Espace réservé du contenu 2"/>
+          <p:cNvSpPr>
+            <a:spLocks noGrp="1"/>
+          </p:cNvSpPr>
+          <p:nvPr>
+            <p:ph idx="1"/>
+          </p:nvPr>
+        </p:nvSpPr>
+        <p:spPr/>
+        <p:txBody>
+          <a:bodyPr/>
+          <a:lstStyle/>
+          <a:p>
+            <a:r>
+              <a:rPr lang="fr-FR" dirty="0" smtClean="0"/>
+              <a:t>Trop proche du code source</a:t>
+            </a:r>
+          </a:p>
+          <a:p>
+            <a:r>
+              <a:rPr lang="fr-FR" dirty="0" smtClean="0"/>
+              <a:t>Cycle de vie très différent</a:t>
+            </a:r>
+          </a:p>
+          <a:p>
+            <a:r>
+              <a:rPr lang="fr-FR" dirty="0" smtClean="0"/>
+              <a:t>Dérangement de l’équipe R&amp;D</a:t>
+            </a:r>
+          </a:p>
+          <a:p>
+            <a:endParaRPr lang="fr-FR" dirty="0"/>
+          </a:p>
+          <a:p>
+            <a:r>
+              <a:rPr lang="fr-FR" dirty="0" smtClean="0"/>
+              <a:t>D’autres solution ?</a:t>
+            </a:r>
+          </a:p>
+          <a:p>
+            <a:pPr lvl="1"/>
+            <a:r>
+              <a:rPr lang="fr-FR" dirty="0" err="1" smtClean="0"/>
+              <a:t>Talend</a:t>
+            </a:r>
+            <a:r>
+              <a:rPr lang="fr-FR" dirty="0" smtClean="0"/>
+              <a:t>/</a:t>
+            </a:r>
+            <a:r>
+              <a:rPr lang="fr-FR" dirty="0" err="1" smtClean="0"/>
+              <a:t>Bonita</a:t>
+            </a:r>
+            <a:r>
+              <a:rPr lang="fr-FR" dirty="0" smtClean="0"/>
+              <a:t> : « </a:t>
+            </a:r>
+            <a:r>
+              <a:rPr lang="fr-FR" dirty="0" err="1" smtClean="0"/>
+              <a:t>Babili</a:t>
+            </a:r>
+            <a:r>
+              <a:rPr lang="fr-FR" dirty="0" smtClean="0"/>
+              <a:t> » - PHP Self-made</a:t>
+            </a:r>
+          </a:p>
+          <a:p>
+            <a:pPr lvl="1"/>
+            <a:r>
+              <a:rPr lang="fr-FR" dirty="0" err="1" smtClean="0"/>
+              <a:t>Altassian</a:t>
+            </a:r>
+            <a:r>
+              <a:rPr lang="fr-FR" smtClean="0"/>
+              <a:t> : </a:t>
+            </a:r>
+            <a:endParaRPr lang="fr-FR" dirty="0"/>
+          </a:p>
+        </p:txBody>
+      </p:sp>
+    </p:spTree>
+    <p:extLst>
+      <p:ext uri="{BB962C8B-B14F-4D97-AF65-F5344CB8AC3E}">
+        <p14:creationId xmlns:p14="http://schemas.microsoft.com/office/powerpoint/2010/main" val="2188604847"/>
+      </p:ext>
+    </p:extLst>
+  </p:cSld>
+  <p:clrMapOvr>
+    <a:masterClrMapping/>
+  </p:clrMapOvr>
+</p:sld>
+</file>
+
+<file path=ppt/slides/slide4.xml><?xml version="1.0" encoding="utf-8"?>
+<p:sld xmlns:a="http://schemas.openxmlformats.org/drawingml/2006/main" xmlns:r="http://schemas.openxmlformats.org/officeDocument/2006/relationships" xmlns:p="http://schemas.openxmlformats.org/presentationml/2006/main">
+  <p:cSld>
+    <p:spTree>
+      <p:nvGrpSpPr>
+        <p:cNvPr id="1" name=""/>
+        <p:cNvGrpSpPr/>
+        <p:nvPr/>
+      </p:nvGrpSpPr>
+      <p:grpSpPr>
+        <a:xfrm>
+          <a:off x="0" y="0"/>
+          <a:ext cx="0" cy="0"/>
+          <a:chOff x="0" y="0"/>
+          <a:chExt cx="0" cy="0"/>
+        </a:xfrm>
+      </p:grpSpPr>
+      <p:sp>
+        <p:nvSpPr>
+          <p:cNvPr id="2" name="Titre 1"/>
+          <p:cNvSpPr>
+            <a:spLocks noGrp="1"/>
+          </p:cNvSpPr>
+          <p:nvPr>
+            <p:ph type="title"/>
+          </p:nvPr>
+        </p:nvSpPr>
+        <p:spPr/>
+        <p:txBody>
+          <a:bodyPr/>
+          <a:lstStyle/>
+          <a:p>
+            <a:r>
+              <a:rPr lang="fr-FR" dirty="0" smtClean="0"/>
               <a:t>Des outils</a:t>
             </a:r>
             <a:endParaRPr lang="fr-FR" dirty="0"/>
@@ -3258,24 +3570,107 @@
         </p:spPr>
         <p:txBody>
           <a:bodyPr anchor="ctr">
-            <a:normAutofit/>
+            <a:normAutofit fontScale="62500" lnSpcReduction="20000"/>
           </a:bodyPr>
           <a:lstStyle/>
           <a:p>
-            <a:pPr marL="0" indent="0" algn="ctr">
+            <a:pPr marL="0" indent="0">
               <a:buNone/>
             </a:pPr>
             <a:r>
-              <a:rPr lang="it-IT" sz="4400" dirty="0"/>
-              <a:t>http://</a:t>
-            </a:r>
-            <a:r>
-              <a:rPr lang="it-IT" sz="4400" dirty="0" err="1"/>
+              <a:rPr lang="it-IT" sz="4400" dirty="0" err="1" smtClean="0"/>
+              <a:t>MyGengo</a:t>
+            </a:r>
+            <a:r>
+              <a:rPr lang="it-IT" sz="4400" dirty="0" smtClean="0"/>
+              <a:t> :</a:t>
+            </a:r>
+          </a:p>
+          <a:p>
+            <a:r>
+              <a:rPr lang="it-IT" sz="4400" dirty="0" smtClean="0">
+                <a:hlinkClick r:id="rId2"/>
+              </a:rPr>
+              <a:t>http</a:t>
+            </a:r>
+            <a:r>
+              <a:rPr lang="it-IT" sz="4400" dirty="0">
+                <a:hlinkClick r:id="rId2"/>
+              </a:rPr>
+              <a:t>://</a:t>
+            </a:r>
+            <a:r>
+              <a:rPr lang="it-IT" sz="4400" dirty="0" smtClean="0">
+                <a:hlinkClick r:id="rId2"/>
+              </a:rPr>
               <a:t>mygengo.com</a:t>
             </a:r>
-            <a:r>
-              <a:rPr lang="it-IT" sz="4400" dirty="0"/>
-              <a:t>/api/</a:t>
+            <a:endParaRPr lang="it-IT" sz="4400" dirty="0" smtClean="0"/>
+          </a:p>
+          <a:p>
+            <a:r>
+              <a:rPr lang="it-IT" sz="4400" dirty="0" smtClean="0"/>
+              <a:t>Service de </a:t>
+            </a:r>
+            <a:r>
+              <a:rPr lang="it-IT" sz="4400" dirty="0" err="1" smtClean="0"/>
+              <a:t>traduction</a:t>
+            </a:r>
+            <a:r>
+              <a:rPr lang="it-IT" sz="4400" dirty="0" smtClean="0"/>
+              <a:t> </a:t>
+            </a:r>
+            <a:r>
+              <a:rPr lang="it-IT" sz="4400" dirty="0" err="1" smtClean="0"/>
+              <a:t>avec</a:t>
+            </a:r>
+            <a:r>
+              <a:rPr lang="it-IT" sz="4400" dirty="0" smtClean="0"/>
+              <a:t> API</a:t>
+            </a:r>
+          </a:p>
+          <a:p>
+            <a:pPr marL="0" indent="0">
+              <a:buNone/>
+            </a:pPr>
+            <a:r>
+              <a:rPr lang="en-US" sz="4400" dirty="0" err="1" smtClean="0"/>
+              <a:t>Pootle</a:t>
+            </a:r>
+            <a:r>
+              <a:rPr lang="en-US" sz="4400" dirty="0" smtClean="0"/>
+              <a:t> :</a:t>
+            </a:r>
+          </a:p>
+          <a:p>
+            <a:r>
+              <a:rPr lang="en-US" sz="4400" dirty="0" smtClean="0">
+                <a:hlinkClick r:id="rId3"/>
+              </a:rPr>
+              <a:t>http</a:t>
+            </a:r>
+            <a:r>
+              <a:rPr lang="en-US" sz="4400" dirty="0">
+                <a:hlinkClick r:id="rId3"/>
+              </a:rPr>
+              <a:t>://</a:t>
+            </a:r>
+            <a:r>
+              <a:rPr lang="en-US" sz="4400" dirty="0" smtClean="0">
+                <a:hlinkClick r:id="rId3"/>
+              </a:rPr>
+              <a:t>translate.sourceforge.net</a:t>
+            </a:r>
+            <a:endParaRPr lang="en-US" sz="4400" dirty="0" smtClean="0"/>
+          </a:p>
+          <a:p>
+            <a:r>
+              <a:rPr lang="en-US" sz="4400" dirty="0" err="1" smtClean="0"/>
+              <a:t>Exemple</a:t>
+            </a:r>
+            <a:r>
+              <a:rPr lang="en-US" sz="4400" dirty="0" smtClean="0"/>
+              <a:t> : </a:t>
             </a:r>
             <a:endParaRPr lang="fr-FR" sz="4400" dirty="0"/>
           </a:p>
@@ -3285,6 +3680,102 @@
     <p:extLst>
       <p:ext uri="{BB962C8B-B14F-4D97-AF65-F5344CB8AC3E}">
         <p14:creationId xmlns:p14="http://schemas.microsoft.com/office/powerpoint/2010/main" val="1225078731"/>
+      </p:ext>
+    </p:extLst>
+  </p:cSld>
+  <p:clrMapOvr>
+    <a:masterClrMapping/>
+  </p:clrMapOvr>
+</p:sld>
+</file>
+
+<file path=ppt/slides/slide5.xml><?xml version="1.0" encoding="utf-8"?>
+<p:sld xmlns:a="http://schemas.openxmlformats.org/drawingml/2006/main" xmlns:r="http://schemas.openxmlformats.org/officeDocument/2006/relationships" xmlns:p="http://schemas.openxmlformats.org/presentationml/2006/main">
+  <p:cSld>
+    <p:spTree>
+      <p:nvGrpSpPr>
+        <p:cNvPr id="1" name=""/>
+        <p:cNvGrpSpPr/>
+        <p:nvPr/>
+      </p:nvGrpSpPr>
+      <p:grpSpPr>
+        <a:xfrm>
+          <a:off x="0" y="0"/>
+          <a:ext cx="0" cy="0"/>
+          <a:chOff x="0" y="0"/>
+          <a:chExt cx="0" cy="0"/>
+        </a:xfrm>
+      </p:grpSpPr>
+      <p:sp>
+        <p:nvSpPr>
+          <p:cNvPr id="2" name="Titre 1"/>
+          <p:cNvSpPr>
+            <a:spLocks noGrp="1"/>
+          </p:cNvSpPr>
+          <p:nvPr>
+            <p:ph type="title"/>
+          </p:nvPr>
+        </p:nvSpPr>
+        <p:spPr/>
+        <p:txBody>
+          <a:bodyPr/>
+          <a:lstStyle/>
+          <a:p>
+            <a:r>
+              <a:rPr lang="fr-FR" dirty="0" err="1" smtClean="0"/>
+              <a:t>Resources</a:t>
+            </a:r>
+            <a:endParaRPr lang="fr-FR" dirty="0"/>
+          </a:p>
+        </p:txBody>
+      </p:sp>
+      <p:sp>
+        <p:nvSpPr>
+          <p:cNvPr id="3" name="Espace réservé du contenu 2"/>
+          <p:cNvSpPr>
+            <a:spLocks noGrp="1"/>
+          </p:cNvSpPr>
+          <p:nvPr>
+            <p:ph idx="1"/>
+          </p:nvPr>
+        </p:nvSpPr>
+        <p:spPr/>
+        <p:txBody>
+          <a:bodyPr/>
+          <a:lstStyle/>
+          <a:p>
+            <a:r>
+              <a:rPr lang="pl-PL" dirty="0"/>
+              <a:t>http://</a:t>
+            </a:r>
+            <a:r>
+              <a:rPr lang="pl-PL" dirty="0" err="1"/>
+              <a:t>fr.wikipedia.org</a:t>
+            </a:r>
+            <a:r>
+              <a:rPr lang="pl-PL" dirty="0"/>
+              <a:t>/</a:t>
+            </a:r>
+            <a:r>
+              <a:rPr lang="pl-PL" dirty="0" err="1"/>
+              <a:t>wiki</a:t>
+            </a:r>
+            <a:r>
+              <a:rPr lang="pl-PL" dirty="0"/>
+              <a:t>/</a:t>
+            </a:r>
+            <a:r>
+              <a:rPr lang="pl-PL" dirty="0" err="1"/>
+              <a:t>Crowdsourcing</a:t>
+            </a:r>
+            <a:endParaRPr lang="fr-FR" dirty="0"/>
+          </a:p>
+        </p:txBody>
+      </p:sp>
+    </p:spTree>
+    <p:extLst>
+      <p:ext uri="{BB962C8B-B14F-4D97-AF65-F5344CB8AC3E}">
+        <p14:creationId xmlns:p14="http://schemas.microsoft.com/office/powerpoint/2010/main" val="2910613733"/>
       </p:ext>
     </p:extLst>
   </p:cSld>

</xml_diff>

<commit_message>
Code and slides for i18n and crowd sourcing
</commit_message>
<xml_diff>
--- a/ez18n-slides/ez18n_crowdsourcing.pptx
+++ b/ez18n-slides/ez18n_crowdsourcing.pptx
@@ -8,8 +8,12 @@
     <p:sldId id="256" r:id="rId2"/>
     <p:sldId id="260" r:id="rId3"/>
     <p:sldId id="261" r:id="rId4"/>
-    <p:sldId id="259" r:id="rId5"/>
-    <p:sldId id="262" r:id="rId6"/>
+    <p:sldId id="263" r:id="rId5"/>
+    <p:sldId id="266" r:id="rId6"/>
+    <p:sldId id="265" r:id="rId7"/>
+    <p:sldId id="264" r:id="rId8"/>
+    <p:sldId id="259" r:id="rId9"/>
+    <p:sldId id="262" r:id="rId10"/>
   </p:sldIdLst>
   <p:sldSz cx="9144000" cy="6858000" type="screen4x3"/>
   <p:notesSz cx="6858000" cy="9144000"/>
@@ -3261,7 +3265,7 @@
           <a:p>
             <a:r>
               <a:rPr lang="fr-FR" dirty="0" smtClean="0"/>
-              <a:t>Externaliser i18n</a:t>
+              <a:t>Externaliser l’Internalisation!</a:t>
             </a:r>
             <a:endParaRPr lang="fr-FR" dirty="0"/>
           </a:p>
@@ -3280,7 +3284,7 @@
         <p:spPr/>
         <p:txBody>
           <a:bodyPr>
-            <a:normAutofit/>
+            <a:normAutofit fontScale="92500" lnSpcReduction="20000"/>
           </a:bodyPr>
           <a:lstStyle/>
           <a:p>
@@ -3290,6 +3294,9 @@
             </a:r>
           </a:p>
           <a:p>
+            <a:endParaRPr lang="fr-FR" dirty="0" smtClean="0"/>
+          </a:p>
+          <a:p>
             <a:r>
               <a:rPr lang="fr-FR" dirty="0" smtClean="0"/>
               <a:t>Fichier </a:t>
@@ -3308,6 +3315,13 @@
             <a:r>
               <a:rPr lang="fr-FR" dirty="0" smtClean="0"/>
               <a:t>Ok mais on intègre comment ?</a:t>
+            </a:r>
+          </a:p>
+          <a:p>
+            <a:pPr lvl="1"/>
+            <a:r>
+              <a:rPr lang="fr-FR" dirty="0" smtClean="0"/>
+              <a:t>Gestion de source ?</a:t>
             </a:r>
           </a:p>
           <a:p>
@@ -3452,51 +3466,6 @@
           <a:p>
             <a:endParaRPr lang="fr-FR" dirty="0"/>
           </a:p>
-          <a:p>
-            <a:r>
-              <a:rPr lang="fr-FR" dirty="0" smtClean="0"/>
-              <a:t>D’autres solution ?</a:t>
-            </a:r>
-          </a:p>
-          <a:p>
-            <a:pPr lvl="1"/>
-            <a:r>
-              <a:rPr lang="fr-FR" dirty="0" err="1" smtClean="0"/>
-              <a:t>Talend</a:t>
-            </a:r>
-            <a:r>
-              <a:rPr lang="fr-FR" dirty="0" smtClean="0"/>
-              <a:t>/</a:t>
-            </a:r>
-            <a:r>
-              <a:rPr lang="fr-FR" dirty="0" err="1" smtClean="0"/>
-              <a:t>Bonita</a:t>
-            </a:r>
-            <a:r>
-              <a:rPr lang="fr-FR" dirty="0" smtClean="0"/>
-              <a:t> : « </a:t>
-            </a:r>
-            <a:r>
-              <a:rPr lang="fr-FR" dirty="0" err="1" smtClean="0"/>
-              <a:t>Babili</a:t>
-            </a:r>
-            <a:r>
-              <a:rPr lang="fr-FR" dirty="0" smtClean="0"/>
-              <a:t> » - PHP Self-made</a:t>
-            </a:r>
-          </a:p>
-          <a:p>
-            <a:pPr lvl="1"/>
-            <a:r>
-              <a:rPr lang="fr-FR" dirty="0" err="1" smtClean="0"/>
-              <a:t>Altassian</a:t>
-            </a:r>
-            <a:r>
-              <a:rPr lang="fr-FR" smtClean="0"/>
-              <a:t> : </a:t>
-            </a:r>
-            <a:endParaRPr lang="fr-FR" dirty="0"/>
-          </a:p>
         </p:txBody>
       </p:sp>
     </p:spTree>
@@ -3546,6 +3515,608 @@
           <a:p>
             <a:r>
               <a:rPr lang="fr-FR" dirty="0" smtClean="0"/>
+              <a:t>Des idées de solutions ?</a:t>
+            </a:r>
+            <a:endParaRPr lang="fr-FR" dirty="0"/>
+          </a:p>
+        </p:txBody>
+      </p:sp>
+      <p:sp>
+        <p:nvSpPr>
+          <p:cNvPr id="3" name="Espace réservé du contenu 2"/>
+          <p:cNvSpPr>
+            <a:spLocks noGrp="1"/>
+          </p:cNvSpPr>
+          <p:nvPr>
+            <p:ph idx="1"/>
+          </p:nvPr>
+        </p:nvSpPr>
+        <p:spPr/>
+        <p:txBody>
+          <a:bodyPr/>
+          <a:lstStyle/>
+          <a:p>
+            <a:r>
+              <a:rPr lang="fr-FR" dirty="0"/>
+              <a:t>D’autres solution ?</a:t>
+            </a:r>
+          </a:p>
+          <a:p>
+            <a:pPr lvl="1"/>
+            <a:r>
+              <a:rPr lang="fr-FR" dirty="0" err="1"/>
+              <a:t>Talend</a:t>
+            </a:r>
+            <a:r>
+              <a:rPr lang="fr-FR" dirty="0"/>
+              <a:t>/</a:t>
+            </a:r>
+            <a:r>
+              <a:rPr lang="fr-FR" dirty="0" err="1"/>
+              <a:t>Bonita</a:t>
+            </a:r>
+            <a:r>
+              <a:rPr lang="fr-FR" dirty="0"/>
+              <a:t> : « </a:t>
+            </a:r>
+            <a:r>
+              <a:rPr lang="fr-FR" dirty="0" err="1"/>
+              <a:t>Babili</a:t>
+            </a:r>
+            <a:r>
+              <a:rPr lang="fr-FR" dirty="0"/>
+              <a:t> » - PHP Self-made</a:t>
+            </a:r>
+          </a:p>
+          <a:p>
+            <a:pPr lvl="1"/>
+            <a:r>
+              <a:rPr lang="fr-FR" dirty="0" err="1"/>
+              <a:t>Altassian</a:t>
+            </a:r>
+            <a:r>
+              <a:rPr lang="fr-FR" dirty="0"/>
+              <a:t> Translations</a:t>
+            </a:r>
+          </a:p>
+          <a:p>
+            <a:pPr lvl="1"/>
+            <a:r>
+              <a:rPr lang="fr-FR" dirty="0" err="1"/>
+              <a:t>Pootle</a:t>
+            </a:r>
+            <a:r>
+              <a:rPr lang="fr-FR" dirty="0"/>
+              <a:t> : </a:t>
+            </a:r>
+            <a:r>
+              <a:rPr lang="fr-FR" dirty="0" err="1"/>
+              <a:t>LifeRay</a:t>
+            </a:r>
+            <a:endParaRPr lang="fr-FR" dirty="0"/>
+          </a:p>
+          <a:p>
+            <a:endParaRPr lang="fr-FR" dirty="0" smtClean="0"/>
+          </a:p>
+        </p:txBody>
+      </p:sp>
+    </p:spTree>
+    <p:extLst>
+      <p:ext uri="{BB962C8B-B14F-4D97-AF65-F5344CB8AC3E}">
+        <p14:creationId xmlns:p14="http://schemas.microsoft.com/office/powerpoint/2010/main" val="336790186"/>
+      </p:ext>
+    </p:extLst>
+  </p:cSld>
+  <p:clrMapOvr>
+    <a:masterClrMapping/>
+  </p:clrMapOvr>
+</p:sld>
+</file>
+
+<file path=ppt/slides/slide5.xml><?xml version="1.0" encoding="utf-8"?>
+<p:sld xmlns:a="http://schemas.openxmlformats.org/drawingml/2006/main" xmlns:r="http://schemas.openxmlformats.org/officeDocument/2006/relationships" xmlns:p="http://schemas.openxmlformats.org/presentationml/2006/main">
+  <p:cSld>
+    <p:spTree>
+      <p:nvGrpSpPr>
+        <p:cNvPr id="1" name=""/>
+        <p:cNvGrpSpPr/>
+        <p:nvPr/>
+      </p:nvGrpSpPr>
+      <p:grpSpPr>
+        <a:xfrm>
+          <a:off x="0" y="0"/>
+          <a:ext cx="0" cy="0"/>
+          <a:chOff x="0" y="0"/>
+          <a:chExt cx="0" cy="0"/>
+        </a:xfrm>
+      </p:grpSpPr>
+      <p:pic>
+        <p:nvPicPr>
+          <p:cNvPr id="4" name="Espace réservé du contenu 3" descr="crowd-babili.png"/>
+          <p:cNvPicPr>
+            <a:picLocks noGrp="1" noChangeAspect="1"/>
+          </p:cNvPicPr>
+          <p:nvPr>
+            <p:ph idx="1"/>
+          </p:nvPr>
+        </p:nvPicPr>
+        <p:blipFill>
+          <a:blip r:embed="rId2">
+            <a:extLst>
+              <a:ext uri="{28A0092B-C50C-407E-A947-70E740481C1C}">
+                <a14:useLocalDpi xmlns:a14="http://schemas.microsoft.com/office/drawing/2010/main" val="0"/>
+              </a:ext>
+            </a:extLst>
+          </a:blip>
+          <a:srcRect l="6289" r="6289"/>
+          <a:stretch>
+            <a:fillRect/>
+          </a:stretch>
+        </p:blipFill>
+        <p:spPr>
+          <a:xfrm>
+            <a:off x="4114800" y="0"/>
+            <a:ext cx="4572000" cy="2514424"/>
+          </a:xfrm>
+        </p:spPr>
+      </p:pic>
+      <p:pic>
+        <p:nvPicPr>
+          <p:cNvPr id="6" name="Image 5" descr="atlassian-translations.png"/>
+          <p:cNvPicPr>
+            <a:picLocks noChangeAspect="1"/>
+          </p:cNvPicPr>
+          <p:nvPr/>
+        </p:nvPicPr>
+        <p:blipFill>
+          <a:blip r:embed="rId3">
+            <a:extLst>
+              <a:ext uri="{28A0092B-C50C-407E-A947-70E740481C1C}">
+                <a14:useLocalDpi xmlns:a14="http://schemas.microsoft.com/office/drawing/2010/main" val="0"/>
+              </a:ext>
+            </a:extLst>
+          </a:blip>
+          <a:stretch>
+            <a:fillRect/>
+          </a:stretch>
+        </p:blipFill>
+        <p:spPr>
+          <a:xfrm>
+            <a:off x="152400" y="1295400"/>
+            <a:ext cx="4714623" cy="2298037"/>
+          </a:xfrm>
+          <a:prstGeom prst="rect">
+            <a:avLst/>
+          </a:prstGeom>
+        </p:spPr>
+      </p:pic>
+      <p:pic>
+        <p:nvPicPr>
+          <p:cNvPr id="5" name="Image 4" descr="crowd-liferay.png"/>
+          <p:cNvPicPr>
+            <a:picLocks noChangeAspect="1"/>
+          </p:cNvPicPr>
+          <p:nvPr/>
+        </p:nvPicPr>
+        <p:blipFill>
+          <a:blip r:embed="rId4">
+            <a:extLst>
+              <a:ext uri="{28A0092B-C50C-407E-A947-70E740481C1C}">
+                <a14:useLocalDpi xmlns:a14="http://schemas.microsoft.com/office/drawing/2010/main" val="0"/>
+              </a:ext>
+            </a:extLst>
+          </a:blip>
+          <a:stretch>
+            <a:fillRect/>
+          </a:stretch>
+        </p:blipFill>
+        <p:spPr>
+          <a:xfrm>
+            <a:off x="2743200" y="2895600"/>
+            <a:ext cx="5105400" cy="2690292"/>
+          </a:xfrm>
+          <a:prstGeom prst="rect">
+            <a:avLst/>
+          </a:prstGeom>
+        </p:spPr>
+      </p:pic>
+      <p:sp>
+        <p:nvSpPr>
+          <p:cNvPr id="7" name="ZoneTexte 6"/>
+          <p:cNvSpPr txBox="1"/>
+          <p:nvPr/>
+        </p:nvSpPr>
+        <p:spPr>
+          <a:xfrm>
+            <a:off x="1828800" y="228600"/>
+            <a:ext cx="2264074" cy="369332"/>
+          </a:xfrm>
+          <a:prstGeom prst="rect">
+            <a:avLst/>
+          </a:prstGeom>
+          <a:noFill/>
+        </p:spPr>
+        <p:txBody>
+          <a:bodyPr wrap="none" rtlCol="0">
+            <a:spAutoFit/>
+          </a:bodyPr>
+          <a:lstStyle/>
+          <a:p>
+            <a:r>
+              <a:rPr lang="fr-FR" dirty="0" err="1" smtClean="0"/>
+              <a:t>Babili</a:t>
+            </a:r>
+            <a:r>
+              <a:rPr lang="fr-FR" dirty="0" smtClean="0"/>
+              <a:t> : </a:t>
+            </a:r>
+            <a:r>
+              <a:rPr lang="fr-FR" dirty="0" err="1" smtClean="0"/>
+              <a:t>bonita</a:t>
+            </a:r>
+            <a:r>
+              <a:rPr lang="fr-FR" dirty="0" smtClean="0"/>
+              <a:t> / </a:t>
+            </a:r>
+            <a:r>
+              <a:rPr lang="fr-FR" dirty="0" err="1" smtClean="0"/>
+              <a:t>talend</a:t>
+            </a:r>
+            <a:endParaRPr lang="fr-FR" dirty="0"/>
+          </a:p>
+        </p:txBody>
+      </p:sp>
+      <p:sp>
+        <p:nvSpPr>
+          <p:cNvPr id="8" name="ZoneTexte 7"/>
+          <p:cNvSpPr txBox="1"/>
+          <p:nvPr/>
+        </p:nvSpPr>
+        <p:spPr>
+          <a:xfrm>
+            <a:off x="228600" y="838200"/>
+            <a:ext cx="2217186" cy="369332"/>
+          </a:xfrm>
+          <a:prstGeom prst="rect">
+            <a:avLst/>
+          </a:prstGeom>
+          <a:noFill/>
+        </p:spPr>
+        <p:txBody>
+          <a:bodyPr wrap="none" rtlCol="0">
+            <a:spAutoFit/>
+          </a:bodyPr>
+          <a:lstStyle/>
+          <a:p>
+            <a:r>
+              <a:rPr lang="fr-FR" dirty="0" err="1" smtClean="0"/>
+              <a:t>Atlassian</a:t>
+            </a:r>
+            <a:r>
+              <a:rPr lang="fr-FR" dirty="0" smtClean="0"/>
+              <a:t> Translations</a:t>
+            </a:r>
+            <a:endParaRPr lang="fr-FR" dirty="0"/>
+          </a:p>
+        </p:txBody>
+      </p:sp>
+      <p:sp>
+        <p:nvSpPr>
+          <p:cNvPr id="9" name="ZoneTexte 8"/>
+          <p:cNvSpPr txBox="1"/>
+          <p:nvPr/>
+        </p:nvSpPr>
+        <p:spPr>
+          <a:xfrm>
+            <a:off x="1828800" y="4267200"/>
+            <a:ext cx="792517" cy="369332"/>
+          </a:xfrm>
+          <a:prstGeom prst="rect">
+            <a:avLst/>
+          </a:prstGeom>
+          <a:noFill/>
+        </p:spPr>
+        <p:txBody>
+          <a:bodyPr wrap="none" rtlCol="0">
+            <a:spAutoFit/>
+          </a:bodyPr>
+          <a:lstStyle/>
+          <a:p>
+            <a:r>
+              <a:rPr lang="fr-FR" dirty="0" err="1" smtClean="0"/>
+              <a:t>Poolte</a:t>
+            </a:r>
+            <a:r>
+              <a:rPr lang="fr-FR" dirty="0" smtClean="0"/>
+              <a:t> </a:t>
+            </a:r>
+            <a:endParaRPr lang="fr-FR" dirty="0"/>
+          </a:p>
+        </p:txBody>
+      </p:sp>
+    </p:spTree>
+    <p:extLst>
+      <p:ext uri="{BB962C8B-B14F-4D97-AF65-F5344CB8AC3E}">
+        <p14:creationId xmlns:p14="http://schemas.microsoft.com/office/powerpoint/2010/main" val="2078528004"/>
+      </p:ext>
+    </p:extLst>
+  </p:cSld>
+  <p:clrMapOvr>
+    <a:masterClrMapping/>
+  </p:clrMapOvr>
+</p:sld>
+</file>
+
+<file path=ppt/slides/slide6.xml><?xml version="1.0" encoding="utf-8"?>
+<p:sld xmlns:a="http://schemas.openxmlformats.org/drawingml/2006/main" xmlns:r="http://schemas.openxmlformats.org/officeDocument/2006/relationships" xmlns:p="http://schemas.openxmlformats.org/presentationml/2006/main">
+  <p:cSld>
+    <p:spTree>
+      <p:nvGrpSpPr>
+        <p:cNvPr id="1" name=""/>
+        <p:cNvGrpSpPr/>
+        <p:nvPr/>
+      </p:nvGrpSpPr>
+      <p:grpSpPr>
+        <a:xfrm>
+          <a:off x="0" y="0"/>
+          <a:ext cx="0" cy="0"/>
+          <a:chOff x="0" y="0"/>
+          <a:chExt cx="0" cy="0"/>
+        </a:xfrm>
+      </p:grpSpPr>
+      <p:sp>
+        <p:nvSpPr>
+          <p:cNvPr id="2" name="Titre 1"/>
+          <p:cNvSpPr>
+            <a:spLocks noGrp="1"/>
+          </p:cNvSpPr>
+          <p:nvPr>
+            <p:ph type="title"/>
+          </p:nvPr>
+        </p:nvSpPr>
+        <p:spPr/>
+        <p:txBody>
+          <a:bodyPr>
+            <a:normAutofit/>
+          </a:bodyPr>
+          <a:lstStyle/>
+          <a:p>
+            <a:r>
+              <a:rPr lang="fr-FR" dirty="0"/>
+              <a:t>Et arrive </a:t>
+            </a:r>
+            <a:r>
+              <a:rPr lang="fr-FR" dirty="0" smtClean="0"/>
+              <a:t>le </a:t>
+            </a:r>
+            <a:r>
+              <a:rPr lang="fr-FR" dirty="0" err="1"/>
+              <a:t>crowd</a:t>
+            </a:r>
+            <a:r>
+              <a:rPr lang="fr-FR" dirty="0"/>
+              <a:t> </a:t>
+            </a:r>
+            <a:r>
+              <a:rPr lang="fr-FR" dirty="0" err="1" smtClean="0"/>
+              <a:t>sourcing</a:t>
+            </a:r>
+            <a:endParaRPr lang="fr-FR" dirty="0"/>
+          </a:p>
+        </p:txBody>
+      </p:sp>
+      <p:sp>
+        <p:nvSpPr>
+          <p:cNvPr id="3" name="Espace réservé du contenu 2"/>
+          <p:cNvSpPr>
+            <a:spLocks noGrp="1"/>
+          </p:cNvSpPr>
+          <p:nvPr>
+            <p:ph idx="1"/>
+          </p:nvPr>
+        </p:nvSpPr>
+        <p:spPr>
+          <a:xfrm>
+            <a:off x="457200" y="1600200"/>
+            <a:ext cx="8686800" cy="4525963"/>
+          </a:xfrm>
+        </p:spPr>
+        <p:txBody>
+          <a:bodyPr/>
+          <a:lstStyle/>
+          <a:p>
+            <a:r>
+              <a:rPr lang="fr-FR" dirty="0" smtClean="0"/>
+              <a:t>Site web ouvert</a:t>
+            </a:r>
+          </a:p>
+          <a:p>
+            <a:r>
+              <a:rPr lang="fr-FR" dirty="0" smtClean="0"/>
+              <a:t>Contribution simple</a:t>
+            </a:r>
+          </a:p>
+          <a:p>
+            <a:r>
+              <a:rPr lang="fr-FR" dirty="0" err="1" smtClean="0"/>
+              <a:t>Workflow</a:t>
+            </a:r>
+            <a:r>
+              <a:rPr lang="fr-FR" dirty="0" smtClean="0"/>
+              <a:t> de validation (</a:t>
+            </a:r>
+            <a:r>
+              <a:rPr lang="fr-FR" dirty="0" err="1" smtClean="0"/>
+              <a:t>editeurs</a:t>
+            </a:r>
+            <a:r>
+              <a:rPr lang="fr-FR" dirty="0" smtClean="0"/>
+              <a:t>, contributeurs)</a:t>
+            </a:r>
+          </a:p>
+          <a:p>
+            <a:r>
+              <a:rPr lang="fr-FR" dirty="0" smtClean="0"/>
+              <a:t>Statistiques</a:t>
+            </a:r>
+          </a:p>
+          <a:p>
+            <a:endParaRPr lang="fr-FR" dirty="0"/>
+          </a:p>
+        </p:txBody>
+      </p:sp>
+    </p:spTree>
+    <p:extLst>
+      <p:ext uri="{BB962C8B-B14F-4D97-AF65-F5344CB8AC3E}">
+        <p14:creationId xmlns:p14="http://schemas.microsoft.com/office/powerpoint/2010/main" val="921606941"/>
+      </p:ext>
+    </p:extLst>
+  </p:cSld>
+  <p:clrMapOvr>
+    <a:masterClrMapping/>
+  </p:clrMapOvr>
+</p:sld>
+</file>
+
+<file path=ppt/slides/slide7.xml><?xml version="1.0" encoding="utf-8"?>
+<p:sld xmlns:a="http://schemas.openxmlformats.org/drawingml/2006/main" xmlns:r="http://schemas.openxmlformats.org/officeDocument/2006/relationships" xmlns:p="http://schemas.openxmlformats.org/presentationml/2006/main">
+  <p:cSld>
+    <p:spTree>
+      <p:nvGrpSpPr>
+        <p:cNvPr id="1" name=""/>
+        <p:cNvGrpSpPr/>
+        <p:nvPr/>
+      </p:nvGrpSpPr>
+      <p:grpSpPr>
+        <a:xfrm>
+          <a:off x="0" y="0"/>
+          <a:ext cx="0" cy="0"/>
+          <a:chOff x="0" y="0"/>
+          <a:chExt cx="0" cy="0"/>
+        </a:xfrm>
+      </p:grpSpPr>
+      <p:sp>
+        <p:nvSpPr>
+          <p:cNvPr id="2" name="Titre 1"/>
+          <p:cNvSpPr>
+            <a:spLocks noGrp="1"/>
+          </p:cNvSpPr>
+          <p:nvPr>
+            <p:ph type="title"/>
+          </p:nvPr>
+        </p:nvSpPr>
+        <p:spPr/>
+        <p:txBody>
+          <a:bodyPr/>
+          <a:lstStyle/>
+          <a:p>
+            <a:r>
+              <a:rPr lang="fr-FR" dirty="0" err="1" smtClean="0"/>
+              <a:t>Crowd</a:t>
+            </a:r>
+            <a:r>
+              <a:rPr lang="fr-FR" dirty="0" smtClean="0"/>
+              <a:t> </a:t>
+            </a:r>
+            <a:r>
+              <a:rPr lang="fr-FR" dirty="0" err="1" smtClean="0"/>
+              <a:t>Sourcing</a:t>
+            </a:r>
+            <a:endParaRPr lang="fr-FR" dirty="0"/>
+          </a:p>
+        </p:txBody>
+      </p:sp>
+      <p:sp>
+        <p:nvSpPr>
+          <p:cNvPr id="3" name="Espace réservé du contenu 2"/>
+          <p:cNvSpPr>
+            <a:spLocks noGrp="1"/>
+          </p:cNvSpPr>
+          <p:nvPr>
+            <p:ph idx="1"/>
+          </p:nvPr>
+        </p:nvSpPr>
+        <p:spPr/>
+        <p:txBody>
+          <a:bodyPr/>
+          <a:lstStyle/>
+          <a:p>
+            <a:r>
+              <a:rPr lang="fr-FR" dirty="0" err="1"/>
+              <a:t>g</a:t>
+            </a:r>
+            <a:r>
+              <a:rPr lang="fr-FR" dirty="0" err="1" smtClean="0"/>
+              <a:t>et-localisation.com</a:t>
+            </a:r>
+            <a:endParaRPr lang="fr-FR" dirty="0" smtClean="0"/>
+          </a:p>
+          <a:p>
+            <a:r>
+              <a:rPr lang="fr-FR" dirty="0" err="1" smtClean="0"/>
+              <a:t>MyGengo</a:t>
+            </a:r>
+            <a:endParaRPr lang="fr-FR" dirty="0" smtClean="0"/>
+          </a:p>
+          <a:p>
+            <a:r>
+              <a:rPr lang="fr-FR" dirty="0" err="1" smtClean="0"/>
+              <a:t>Crowdin.net</a:t>
+            </a:r>
+            <a:endParaRPr lang="fr-FR" dirty="0" smtClean="0"/>
+          </a:p>
+          <a:p>
+            <a:endParaRPr lang="fr-FR" dirty="0"/>
+          </a:p>
+        </p:txBody>
+      </p:sp>
+    </p:spTree>
+    <p:extLst>
+      <p:ext uri="{BB962C8B-B14F-4D97-AF65-F5344CB8AC3E}">
+        <p14:creationId xmlns:p14="http://schemas.microsoft.com/office/powerpoint/2010/main" val="1178227274"/>
+      </p:ext>
+    </p:extLst>
+  </p:cSld>
+  <p:clrMapOvr>
+    <a:masterClrMapping/>
+  </p:clrMapOvr>
+</p:sld>
+</file>
+
+<file path=ppt/slides/slide8.xml><?xml version="1.0" encoding="utf-8"?>
+<p:sld xmlns:a="http://schemas.openxmlformats.org/drawingml/2006/main" xmlns:r="http://schemas.openxmlformats.org/officeDocument/2006/relationships" xmlns:p="http://schemas.openxmlformats.org/presentationml/2006/main">
+  <p:cSld>
+    <p:spTree>
+      <p:nvGrpSpPr>
+        <p:cNvPr id="1" name=""/>
+        <p:cNvGrpSpPr/>
+        <p:nvPr/>
+      </p:nvGrpSpPr>
+      <p:grpSpPr>
+        <a:xfrm>
+          <a:off x="0" y="0"/>
+          <a:ext cx="0" cy="0"/>
+          <a:chOff x="0" y="0"/>
+          <a:chExt cx="0" cy="0"/>
+        </a:xfrm>
+      </p:grpSpPr>
+      <p:sp>
+        <p:nvSpPr>
+          <p:cNvPr id="2" name="Titre 1"/>
+          <p:cNvSpPr>
+            <a:spLocks noGrp="1"/>
+          </p:cNvSpPr>
+          <p:nvPr>
+            <p:ph type="title"/>
+          </p:nvPr>
+        </p:nvSpPr>
+        <p:spPr/>
+        <p:txBody>
+          <a:bodyPr/>
+          <a:lstStyle/>
+          <a:p>
+            <a:r>
+              <a:rPr lang="fr-FR" dirty="0" smtClean="0"/>
               <a:t>Des outils</a:t>
             </a:r>
             <a:endParaRPr lang="fr-FR" dirty="0"/>
@@ -3570,7 +4141,7 @@
         </p:spPr>
         <p:txBody>
           <a:bodyPr anchor="ctr">
-            <a:normAutofit fontScale="62500" lnSpcReduction="20000"/>
+            <a:normAutofit fontScale="55000" lnSpcReduction="20000"/>
           </a:bodyPr>
           <a:lstStyle/>
           <a:p>
@@ -3628,6 +4199,9 @@
               <a:rPr lang="it-IT" sz="4400" dirty="0" smtClean="0"/>
               <a:t> API</a:t>
             </a:r>
+          </a:p>
+          <a:p>
+            <a:endParaRPr lang="it-IT" sz="4400" dirty="0" smtClean="0"/>
           </a:p>
           <a:p>
             <a:pPr marL="0" indent="0">
@@ -3689,7 +4263,7 @@
 </p:sld>
 </file>
 
-<file path=ppt/slides/slide5.xml><?xml version="1.0" encoding="utf-8"?>
+<file path=ppt/slides/slide9.xml><?xml version="1.0" encoding="utf-8"?>
 <p:sld xmlns:a="http://schemas.openxmlformats.org/drawingml/2006/main" xmlns:r="http://schemas.openxmlformats.org/officeDocument/2006/relationships" xmlns:p="http://schemas.openxmlformats.org/presentationml/2006/main">
   <p:cSld>
     <p:spTree>

</xml_diff>